<commit_message>
added data visualization code
</commit_message>
<xml_diff>
--- a/Data Visualization/Python for Data Visualizations 2022.pptx
+++ b/Data Visualization/Python for Data Visualizations 2022.pptx
@@ -5,7 +5,7 @@
     <p:sldMasterId id="2147483660" r:id="rId1"/>
   </p:sldMasterIdLst>
   <p:notesMasterIdLst>
-    <p:notesMasterId r:id="rId19"/>
+    <p:notesMasterId r:id="rId20"/>
   </p:notesMasterIdLst>
   <p:sldIdLst>
     <p:sldId id="256" r:id="rId2"/>
@@ -25,6 +25,7 @@
     <p:sldId id="656" r:id="rId16"/>
     <p:sldId id="657" r:id="rId17"/>
     <p:sldId id="660" r:id="rId18"/>
+    <p:sldId id="661" r:id="rId19"/>
   </p:sldIdLst>
   <p:sldSz cx="12192000" cy="6858000"/>
   <p:notesSz cx="6858000" cy="9144000"/>
@@ -224,7 +225,7 @@
           <a:p>
             <a:fld id="{9EE6CD49-14BB-CF43-ABEC-D9DBD34BD44E}" type="datetimeFigureOut">
               <a:rPr lang="en-US" smtClean="0"/>
-              <a:t>2/9/22</a:t>
+              <a:t>6/21/22</a:t>
             </a:fld>
             <a:endParaRPr lang="en-US"/>
           </a:p>
@@ -1222,7 +1223,7 @@
           <a:p>
             <a:fld id="{7C23C5D5-AA35-B943-B6A5-B0E52E141B2A}" type="datetime1">
               <a:rPr lang="en-US" smtClean="0"/>
-              <a:t>2/9/22</a:t>
+              <a:t>6/21/22</a:t>
             </a:fld>
             <a:endParaRPr lang="en-US"/>
           </a:p>
@@ -1363,7 +1364,7 @@
           <a:p>
             <a:fld id="{831D9B2A-A537-0E46-BBB3-080670C0F82A}" type="datetime1">
               <a:rPr lang="en-US" smtClean="0"/>
-              <a:t>2/9/22</a:t>
+              <a:t>6/21/22</a:t>
             </a:fld>
             <a:endParaRPr lang="en-US"/>
           </a:p>
@@ -1476,7 +1477,7 @@
           <a:p>
             <a:fld id="{36F43099-2F68-DB44-BD42-F7F98702E92E}" type="datetime1">
               <a:rPr lang="en-US" smtClean="0"/>
-              <a:t>2/9/22</a:t>
+              <a:t>6/21/22</a:t>
             </a:fld>
             <a:endParaRPr lang="en-US"/>
           </a:p>
@@ -2376,7 +2377,7 @@
           <a:p>
             <a:fld id="{6CC0172C-FD34-6441-9CDA-4D44D472119C}" type="datetime1">
               <a:rPr lang="en-US" smtClean="0"/>
-              <a:t>2/9/22</a:t>
+              <a:t>6/21/22</a:t>
             </a:fld>
             <a:endParaRPr lang="en-US"/>
           </a:p>
@@ -6042,6 +6043,123 @@
 </p:sld>
 </file>
 
+<file path=ppt/slides/slide18.xml><?xml version="1.0" encoding="utf-8"?>
+<p:sld xmlns:a="http://schemas.openxmlformats.org/drawingml/2006/main" xmlns:r="http://schemas.openxmlformats.org/officeDocument/2006/relationships" xmlns:p="http://schemas.openxmlformats.org/presentationml/2006/main">
+  <p:cSld>
+    <p:spTree>
+      <p:nvGrpSpPr>
+        <p:cNvPr id="1" name=""/>
+        <p:cNvGrpSpPr/>
+        <p:nvPr/>
+      </p:nvGrpSpPr>
+      <p:grpSpPr>
+        <a:xfrm>
+          <a:off x="0" y="0"/>
+          <a:ext cx="0" cy="0"/>
+          <a:chOff x="0" y="0"/>
+          <a:chExt cx="0" cy="0"/>
+        </a:xfrm>
+      </p:grpSpPr>
+      <p:sp>
+        <p:nvSpPr>
+          <p:cNvPr id="2" name="Title 1">
+            <a:extLst>
+              <a:ext uri="{FF2B5EF4-FFF2-40B4-BE49-F238E27FC236}">
+                <a16:creationId xmlns:a16="http://schemas.microsoft.com/office/drawing/2014/main" id="{9243CBE3-E187-BB61-01A9-0B040A2E41B8}"/>
+              </a:ext>
+            </a:extLst>
+          </p:cNvPr>
+          <p:cNvSpPr>
+            <a:spLocks noGrp="1"/>
+          </p:cNvSpPr>
+          <p:nvPr>
+            <p:ph type="title"/>
+          </p:nvPr>
+        </p:nvSpPr>
+        <p:spPr/>
+        <p:txBody>
+          <a:bodyPr/>
+          <a:lstStyle/>
+          <a:p>
+            <a:r>
+              <a:rPr lang="en-US" dirty="0"/>
+              <a:t>Grammar of Graphics</a:t>
+            </a:r>
+          </a:p>
+        </p:txBody>
+      </p:sp>
+      <p:sp>
+        <p:nvSpPr>
+          <p:cNvPr id="3" name="Slide Number Placeholder 2">
+            <a:extLst>
+              <a:ext uri="{FF2B5EF4-FFF2-40B4-BE49-F238E27FC236}">
+                <a16:creationId xmlns:a16="http://schemas.microsoft.com/office/drawing/2014/main" id="{2A636AD4-AAB8-4A43-1A95-880D37840CFD}"/>
+              </a:ext>
+            </a:extLst>
+          </p:cNvPr>
+          <p:cNvSpPr>
+            <a:spLocks noGrp="1"/>
+          </p:cNvSpPr>
+          <p:nvPr>
+            <p:ph type="sldNum" sz="quarter" idx="12"/>
+          </p:nvPr>
+        </p:nvSpPr>
+        <p:spPr/>
+        <p:txBody>
+          <a:bodyPr/>
+          <a:lstStyle/>
+          <a:p>
+            <a:fld id="{FD268959-0C7B-DE40-B0DF-834DF71CC0C8}" type="slidenum">
+              <a:rPr lang="en-US" smtClean="0"/>
+              <a:t>18</a:t>
+            </a:fld>
+            <a:endParaRPr lang="en-US"/>
+          </a:p>
+        </p:txBody>
+      </p:sp>
+      <p:pic>
+        <p:nvPicPr>
+          <p:cNvPr id="5" name="Picture 4" descr="Chart, funnel chart&#10;&#10;Description automatically generated">
+            <a:extLst>
+              <a:ext uri="{FF2B5EF4-FFF2-40B4-BE49-F238E27FC236}">
+                <a16:creationId xmlns:a16="http://schemas.microsoft.com/office/drawing/2014/main" id="{4A83CA16-5882-D39F-0971-C085EC26455F}"/>
+              </a:ext>
+            </a:extLst>
+          </p:cNvPr>
+          <p:cNvPicPr>
+            <a:picLocks noChangeAspect="1"/>
+          </p:cNvPicPr>
+          <p:nvPr/>
+        </p:nvPicPr>
+        <p:blipFill>
+          <a:blip r:embed="rId2"/>
+          <a:stretch>
+            <a:fillRect/>
+          </a:stretch>
+        </p:blipFill>
+        <p:spPr>
+          <a:xfrm>
+            <a:off x="2612705" y="2017610"/>
+            <a:ext cx="5892800" cy="3644900"/>
+          </a:xfrm>
+          <a:prstGeom prst="rect">
+            <a:avLst/>
+          </a:prstGeom>
+        </p:spPr>
+      </p:pic>
+    </p:spTree>
+    <p:extLst>
+      <p:ext uri="{BB962C8B-B14F-4D97-AF65-F5344CB8AC3E}">
+        <p14:creationId xmlns:p14="http://schemas.microsoft.com/office/powerpoint/2010/main" val="49159129"/>
+      </p:ext>
+    </p:extLst>
+  </p:cSld>
+  <p:clrMapOvr>
+    <a:masterClrMapping/>
+  </p:clrMapOvr>
+</p:sld>
+</file>
+
 <file path=ppt/slides/slide2.xml><?xml version="1.0" encoding="utf-8"?>
 <p:sld xmlns:a="http://schemas.openxmlformats.org/drawingml/2006/main" xmlns:r="http://schemas.openxmlformats.org/officeDocument/2006/relationships" xmlns:p="http://schemas.openxmlformats.org/presentationml/2006/main">
   <p:cSld>

</xml_diff>